<commit_message>
Updated Slides after input from morning meeting
</commit_message>
<xml_diff>
--- a/SPHEREx-Calibration-Automation/presentations/SPHEREx_Calibration_Automation_Plan__Optics_Meeting_02162021.pptx
+++ b/SPHEREx-Calibration-Automation/presentations/SPHEREx_Calibration_Automation_Plan__Optics_Meeting_02162021.pptx
@@ -15978,11 +15978,17 @@
           <p:cNvGraphicFramePr>
             <a:graphicFrameLocks/>
           </p:cNvGraphicFramePr>
-          <p:nvPr/>
+          <p:nvPr>
+            <p:extLst>
+              <p:ext uri="{D42A27DB-BD31-4B8C-83A1-F6EECF244321}">
+                <p14:modId xmlns:p14="http://schemas.microsoft.com/office/powerpoint/2010/main" val="4088429134"/>
+              </p:ext>
+            </p:extLst>
+          </p:nvPr>
         </p:nvGraphicFramePr>
         <p:xfrm>
           <a:off x="850830" y="1514089"/>
-          <a:ext cx="10515598" cy="5107159"/>
+          <a:ext cx="10515598" cy="4880638"/>
         </p:xfrm>
         <a:graphic>
           <a:graphicData uri="http://schemas.openxmlformats.org/drawingml/2006/table">
@@ -15998,42 +16004,42 @@
                     </a:ext>
                   </a:extLst>
                 </a:gridCol>
-                <a:gridCol w="1389281">
+                <a:gridCol w="1426813">
                   <a:extLst>
                     <a:ext uri="{9D8B030D-6E8A-4147-A177-3AD203B41FA5}">
                       <a16:colId xmlns:a16="http://schemas.microsoft.com/office/drawing/2014/main" val="572315178"/>
                     </a:ext>
                   </a:extLst>
                 </a:gridCol>
-                <a:gridCol w="1163274">
+                <a:gridCol w="1634121">
                   <a:extLst>
                     <a:ext uri="{9D8B030D-6E8A-4147-A177-3AD203B41FA5}">
                       <a16:colId xmlns:a16="http://schemas.microsoft.com/office/drawing/2014/main" val="278946241"/>
                     </a:ext>
                   </a:extLst>
                 </a:gridCol>
-                <a:gridCol w="1185596">
+                <a:gridCol w="1185770">
                   <a:extLst>
                     <a:ext uri="{9D8B030D-6E8A-4147-A177-3AD203B41FA5}">
                       <a16:colId xmlns:a16="http://schemas.microsoft.com/office/drawing/2014/main" val="2325691439"/>
                     </a:ext>
                   </a:extLst>
                 </a:gridCol>
-                <a:gridCol w="1502229">
+                <a:gridCol w="1510235">
                   <a:extLst>
                     <a:ext uri="{9D8B030D-6E8A-4147-A177-3AD203B41FA5}">
                       <a16:colId xmlns:a16="http://schemas.microsoft.com/office/drawing/2014/main" val="1435709"/>
                     </a:ext>
                   </a:extLst>
                 </a:gridCol>
-                <a:gridCol w="1502229">
+                <a:gridCol w="1297858">
                   <a:extLst>
                     <a:ext uri="{9D8B030D-6E8A-4147-A177-3AD203B41FA5}">
                       <a16:colId xmlns:a16="http://schemas.microsoft.com/office/drawing/2014/main" val="2161347024"/>
                     </a:ext>
                   </a:extLst>
                 </a:gridCol>
-                <a:gridCol w="1502229">
+                <a:gridCol w="1190041">
                   <a:extLst>
                     <a:ext uri="{9D8B030D-6E8A-4147-A177-3AD203B41FA5}">
                       <a16:colId xmlns:a16="http://schemas.microsoft.com/office/drawing/2014/main" val="731301811"/>
@@ -16255,7 +16261,7 @@
                   </a:ext>
                 </a:extLst>
               </a:tr>
-              <a:tr h="992359">
+              <a:tr h="777810">
                 <a:tc>
                   <a:txBody>
                     <a:bodyPr/>
@@ -16412,10 +16418,9 @@
                     <a:lstStyle/>
                     <a:p>
                       <a:r>
-                        <a:rPr lang="en-US"/>
-                        <a:t>active</a:t>
+                        <a:rPr lang="en-US" dirty="0"/>
+                        <a:t>passive</a:t>
                       </a:r>
-                      <a:endParaRPr lang="en-US" dirty="0"/>
                     </a:p>
                   </a:txBody>
                   <a:tcPr/>
@@ -16426,10 +16431,9 @@
                     <a:lstStyle/>
                     <a:p>
                       <a:r>
-                        <a:rPr lang="en-US"/>
+                        <a:rPr lang="en-US" dirty="0"/>
                         <a:t>automated</a:t>
                       </a:r>
-                      <a:endParaRPr lang="en-US" dirty="0"/>
                     </a:p>
                   </a:txBody>
                   <a:tcPr/>
@@ -16466,14 +16470,14 @@
                   </a:ext>
                 </a:extLst>
               </a:tr>
-              <a:tr h="992359">
+              <a:tr h="923249">
                 <a:tc>
                   <a:txBody>
                     <a:bodyPr/>
                     <a:lstStyle/>
                     <a:p>
                       <a:r>
-                        <a:rPr lang="en-US"/>
+                        <a:rPr lang="en-US" dirty="0"/>
                         <a:t>Oriel Filter Wheel</a:t>
                       </a:r>
                     </a:p>
@@ -16490,10 +16494,13 @@
                         <a:t>Ribbon to </a:t>
                       </a:r>
                       <a:r>
-                        <a:rPr lang="en-US"/>
-                        <a:t>Monochro-meter</a:t>
+                        <a:rPr lang="en-US" dirty="0" err="1"/>
+                        <a:t>Monochro</a:t>
                       </a:r>
-                      <a:endParaRPr lang="en-US" dirty="0"/>
+                      <a:r>
+                        <a:rPr lang="en-US" dirty="0"/>
+                        <a:t>-meter</a:t>
+                      </a:r>
                     </a:p>
                   </a:txBody>
                   <a:tcPr/>
@@ -16596,8 +16603,8 @@
                     <a:lstStyle/>
                     <a:p>
                       <a:r>
-                        <a:rPr lang="en-US"/>
-                        <a:t>USB 2.0/RS232</a:t>
+                        <a:rPr lang="en-US" dirty="0"/>
+                        <a:t>USB 2.0/ RS232</a:t>
                       </a:r>
                     </a:p>
                   </a:txBody>
@@ -16675,7 +16682,105 @@
                   </a:ext>
                 </a:extLst>
               </a:tr>
-              <a:tr h="304914">
+              <a:tr h="486697">
+                <a:tc>
+                  <a:txBody>
+                    <a:bodyPr/>
+                    <a:lstStyle/>
+                    <a:p>
+                      <a:r>
+                        <a:rPr lang="en-US" dirty="0"/>
+                        <a:t>Cold Shutter</a:t>
+                      </a:r>
+                    </a:p>
+                  </a:txBody>
+                  <a:tcPr/>
+                </a:tc>
+                <a:tc>
+                  <a:txBody>
+                    <a:bodyPr/>
+                    <a:lstStyle/>
+                    <a:p>
+                      <a:r>
+                        <a:rPr lang="en-US" dirty="0"/>
+                        <a:t>TTL</a:t>
+                      </a:r>
+                    </a:p>
+                  </a:txBody>
+                  <a:tcPr/>
+                </a:tc>
+                <a:tc>
+                  <a:txBody>
+                    <a:bodyPr/>
+                    <a:lstStyle/>
+                    <a:p>
+                      <a:r>
+                        <a:rPr lang="en-US" dirty="0"/>
+                        <a:t>Arduino</a:t>
+                      </a:r>
+                    </a:p>
+                  </a:txBody>
+                  <a:tcPr/>
+                </a:tc>
+                <a:tc>
+                  <a:txBody>
+                    <a:bodyPr/>
+                    <a:lstStyle/>
+                    <a:p>
+                      <a:r>
+                        <a:rPr lang="en-US" dirty="0"/>
+                        <a:t>passive</a:t>
+                      </a:r>
+                    </a:p>
+                  </a:txBody>
+                  <a:tcPr/>
+                </a:tc>
+                <a:tc>
+                  <a:txBody>
+                    <a:bodyPr/>
+                    <a:lstStyle/>
+                    <a:p>
+                      <a:r>
+                        <a:rPr lang="en-US" dirty="0"/>
+                        <a:t>automated</a:t>
+                      </a:r>
+                    </a:p>
+                  </a:txBody>
+                  <a:tcPr/>
+                </a:tc>
+                <a:tc>
+                  <a:txBody>
+                    <a:bodyPr/>
+                    <a:lstStyle/>
+                    <a:p>
+                      <a:r>
+                        <a:rPr lang="en-US" dirty="0"/>
+                        <a:t>no</a:t>
+                      </a:r>
+                    </a:p>
+                  </a:txBody>
+                  <a:tcPr/>
+                </a:tc>
+                <a:tc>
+                  <a:txBody>
+                    <a:bodyPr/>
+                    <a:lstStyle/>
+                    <a:p>
+                      <a:r>
+                        <a:rPr lang="en-US" dirty="0"/>
+                        <a:t>no</a:t>
+                      </a:r>
+                    </a:p>
+                  </a:txBody>
+                  <a:tcPr/>
+                </a:tc>
+                <a:extLst>
+                  <a:ext uri="{0D108BD9-81ED-4DB2-BD59-A6C34878D82A}">
+                    <a16:rowId xmlns:a16="http://schemas.microsoft.com/office/drawing/2014/main" val="3865786093"/>
+                  </a:ext>
+                </a:extLst>
+              </a:tr>
+              <a:tr h="406882">
                 <a:tc>
                   <a:txBody>
                     <a:bodyPr/>
@@ -16767,10 +16872,9 @@
                     <a:lstStyle/>
                     <a:p>
                       <a:r>
-                        <a:rPr lang="en-US"/>
+                        <a:rPr lang="en-US" dirty="0"/>
                         <a:t>yes</a:t>
                       </a:r>
-                      <a:endParaRPr lang="en-US" dirty="0"/>
                     </a:p>
                   </a:txBody>
                   <a:tcPr/>
@@ -16785,6 +16889,45 @@
           </a:graphicData>
         </a:graphic>
       </p:graphicFrame>
+      <p:sp>
+        <p:nvSpPr>
+          <p:cNvPr id="3" name="TextBox 2">
+            <a:extLst>
+              <a:ext uri="{FF2B5EF4-FFF2-40B4-BE49-F238E27FC236}">
+                <a16:creationId xmlns:a16="http://schemas.microsoft.com/office/drawing/2014/main" id="{188CC229-91DC-479D-817E-797BB48998F6}"/>
+              </a:ext>
+            </a:extLst>
+          </p:cNvPr>
+          <p:cNvSpPr txBox="1"/>
+          <p:nvPr/>
+        </p:nvSpPr>
+        <p:spPr>
+          <a:xfrm>
+            <a:off x="6017343" y="365125"/>
+            <a:ext cx="2129667" cy="1200329"/>
+          </a:xfrm>
+          <a:prstGeom prst="rect">
+            <a:avLst/>
+          </a:prstGeom>
+          <a:noFill/>
+        </p:spPr>
+        <p:txBody>
+          <a:bodyPr wrap="square" rtlCol="0">
+            <a:spAutoFit/>
+          </a:bodyPr>
+          <a:lstStyle/>
+          <a:p>
+            <a:r>
+              <a:rPr lang="en-US" i="1" dirty="0"/>
+              <a:t>Active</a:t>
+            </a:r>
+            <a:r>
+              <a:rPr lang="en-US" dirty="0"/>
+              <a:t> means something that changes between each frame/file.</a:t>
+            </a:r>
+          </a:p>
+        </p:txBody>
+      </p:sp>
     </p:spTree>
     <p:extLst>
       <p:ext uri="{BB962C8B-B14F-4D97-AF65-F5344CB8AC3E}">
@@ -16886,7 +17029,13 @@
           <p:cNvGraphicFramePr>
             <a:graphicFrameLocks/>
           </p:cNvGraphicFramePr>
-          <p:nvPr/>
+          <p:nvPr>
+            <p:extLst>
+              <p:ext uri="{D42A27DB-BD31-4B8C-83A1-F6EECF244321}">
+                <p14:modId xmlns:p14="http://schemas.microsoft.com/office/powerpoint/2010/main" val="2830379202"/>
+              </p:ext>
+            </p:extLst>
+          </p:nvPr>
         </p:nvGraphicFramePr>
         <p:xfrm>
           <a:off x="838200" y="1825625"/>
@@ -16906,21 +17055,21 @@
                     </a:ext>
                   </a:extLst>
                 </a:gridCol>
-                <a:gridCol w="932481">
+                <a:gridCol w="1278365">
                   <a:extLst>
                     <a:ext uri="{9D8B030D-6E8A-4147-A177-3AD203B41FA5}">
                       <a16:colId xmlns:a16="http://schemas.microsoft.com/office/drawing/2014/main" val="572315178"/>
                     </a:ext>
                   </a:extLst>
                 </a:gridCol>
-                <a:gridCol w="1502229">
+                <a:gridCol w="1445342">
                   <a:extLst>
                     <a:ext uri="{9D8B030D-6E8A-4147-A177-3AD203B41FA5}">
                       <a16:colId xmlns:a16="http://schemas.microsoft.com/office/drawing/2014/main" val="278946241"/>
                     </a:ext>
                   </a:extLst>
                 </a:gridCol>
-                <a:gridCol w="1502229">
+                <a:gridCol w="1213232">
                   <a:extLst>
                     <a:ext uri="{9D8B030D-6E8A-4147-A177-3AD203B41FA5}">
                       <a16:colId xmlns:a16="http://schemas.microsoft.com/office/drawing/2014/main" val="2352028155"/>
@@ -17273,7 +17422,14 @@
                       </a:r>
                     </a:p>
                   </a:txBody>
-                  <a:tcPr/>
+                  <a:tcPr>
+                    <a:solidFill>
+                      <a:schemeClr val="accent2">
+                        <a:lumMod val="20000"/>
+                        <a:lumOff val="80000"/>
+                      </a:schemeClr>
+                    </a:solidFill>
+                  </a:tcPr>
                 </a:tc>
                 <a:tc>
                   <a:txBody>
@@ -17282,11 +17438,39 @@
                     <a:p>
                       <a:r>
                         <a:rPr lang="en-US" dirty="0"/>
-                        <a:t>?</a:t>
+                        <a:t>RS-485</a:t>
                       </a:r>
                     </a:p>
                   </a:txBody>
-                  <a:tcPr/>
+                  <a:tcPr>
+                    <a:solidFill>
+                      <a:schemeClr val="accent2">
+                        <a:lumMod val="20000"/>
+                        <a:lumOff val="80000"/>
+                      </a:schemeClr>
+                    </a:solidFill>
+                  </a:tcPr>
+                </a:tc>
+                <a:tc>
+                  <a:txBody>
+                    <a:bodyPr/>
+                    <a:lstStyle/>
+                    <a:p>
+                      <a:r>
+                        <a:rPr lang="en-US" dirty="0" err="1"/>
+                        <a:t>pySerial</a:t>
+                      </a:r>
+                      <a:endParaRPr lang="en-US" dirty="0"/>
+                    </a:p>
+                  </a:txBody>
+                  <a:tcPr>
+                    <a:solidFill>
+                      <a:schemeClr val="accent2">
+                        <a:lumMod val="20000"/>
+                        <a:lumOff val="80000"/>
+                      </a:schemeClr>
+                    </a:solidFill>
+                  </a:tcPr>
                 </a:tc>
                 <a:tc>
                   <a:txBody>
@@ -17295,11 +17479,18 @@
                     <a:p>
                       <a:r>
                         <a:rPr lang="en-US" dirty="0"/>
-                        <a:t>?</a:t>
+                        <a:t>passive</a:t>
                       </a:r>
                     </a:p>
                   </a:txBody>
-                  <a:tcPr/>
+                  <a:tcPr>
+                    <a:solidFill>
+                      <a:schemeClr val="accent2">
+                        <a:lumMod val="20000"/>
+                        <a:lumOff val="80000"/>
+                      </a:schemeClr>
+                    </a:solidFill>
+                  </a:tcPr>
                 </a:tc>
                 <a:tc>
                   <a:txBody>
@@ -17308,11 +17499,18 @@
                     <a:p>
                       <a:r>
                         <a:rPr lang="en-US" dirty="0"/>
-                        <a:t>?</a:t>
+                        <a:t>automated</a:t>
                       </a:r>
                     </a:p>
                   </a:txBody>
-                  <a:tcPr/>
+                  <a:tcPr>
+                    <a:solidFill>
+                      <a:schemeClr val="accent2">
+                        <a:lumMod val="20000"/>
+                        <a:lumOff val="80000"/>
+                      </a:schemeClr>
+                    </a:solidFill>
+                  </a:tcPr>
                 </a:tc>
                 <a:tc>
                   <a:txBody>
@@ -17321,11 +17519,18 @@
                     <a:p>
                       <a:r>
                         <a:rPr lang="en-US" dirty="0"/>
-                        <a:t>?</a:t>
+                        <a:t>yes</a:t>
                       </a:r>
                     </a:p>
                   </a:txBody>
-                  <a:tcPr/>
+                  <a:tcPr>
+                    <a:solidFill>
+                      <a:schemeClr val="accent2">
+                        <a:lumMod val="20000"/>
+                        <a:lumOff val="80000"/>
+                      </a:schemeClr>
+                    </a:solidFill>
+                  </a:tcPr>
                 </a:tc>
                 <a:tc>
                   <a:txBody>
@@ -17334,24 +17539,18 @@
                     <a:p>
                       <a:r>
                         <a:rPr lang="en-US" dirty="0"/>
-                        <a:t>?</a:t>
+                        <a:t>no</a:t>
                       </a:r>
                     </a:p>
                   </a:txBody>
-                  <a:tcPr/>
-                </a:tc>
-                <a:tc>
-                  <a:txBody>
-                    <a:bodyPr/>
-                    <a:lstStyle/>
-                    <a:p>
-                      <a:r>
-                        <a:rPr lang="en-US" dirty="0"/>
-                        <a:t>?</a:t>
-                      </a:r>
-                    </a:p>
-                  </a:txBody>
-                  <a:tcPr/>
+                  <a:tcPr>
+                    <a:solidFill>
+                      <a:schemeClr val="accent2">
+                        <a:lumMod val="20000"/>
+                        <a:lumOff val="80000"/>
+                      </a:schemeClr>
+                    </a:solidFill>
+                  </a:tcPr>
                 </a:tc>
                 <a:extLst>
                   <a:ext uri="{0D108BD9-81ED-4DB2-BD59-A6C34878D82A}">
@@ -17375,7 +17574,14 @@
                       </a:r>
                     </a:p>
                   </a:txBody>
-                  <a:tcPr/>
+                  <a:tcPr>
+                    <a:solidFill>
+                      <a:schemeClr val="accent2">
+                        <a:lumMod val="20000"/>
+                        <a:lumOff val="80000"/>
+                      </a:schemeClr>
+                    </a:solidFill>
+                  </a:tcPr>
                 </a:tc>
                 <a:tc>
                   <a:txBody>
@@ -17388,7 +17594,14 @@
                       </a:r>
                     </a:p>
                   </a:txBody>
-                  <a:tcPr/>
+                  <a:tcPr>
+                    <a:solidFill>
+                      <a:schemeClr val="accent2">
+                        <a:lumMod val="20000"/>
+                        <a:lumOff val="80000"/>
+                      </a:schemeClr>
+                    </a:solidFill>
+                  </a:tcPr>
                 </a:tc>
                 <a:tc>
                   <a:txBody>
@@ -17396,12 +17609,20 @@
                     <a:lstStyle/>
                     <a:p>
                       <a:r>
-                        <a:rPr lang="en-US" err="1"/>
+                        <a:rPr lang="en-US" dirty="0" err="1"/>
                         <a:t>pySerial</a:t>
                       </a:r>
-                    </a:p>
-                  </a:txBody>
-                  <a:tcPr/>
+                      <a:endParaRPr lang="en-US" dirty="0"/>
+                    </a:p>
+                  </a:txBody>
+                  <a:tcPr>
+                    <a:solidFill>
+                      <a:schemeClr val="accent2">
+                        <a:lumMod val="20000"/>
+                        <a:lumOff val="80000"/>
+                      </a:schemeClr>
+                    </a:solidFill>
+                  </a:tcPr>
                 </a:tc>
                 <a:tc>
                   <a:txBody>
@@ -17414,7 +17635,14 @@
                       </a:r>
                     </a:p>
                   </a:txBody>
-                  <a:tcPr/>
+                  <a:tcPr>
+                    <a:solidFill>
+                      <a:schemeClr val="accent2">
+                        <a:lumMod val="20000"/>
+                        <a:lumOff val="80000"/>
+                      </a:schemeClr>
+                    </a:solidFill>
+                  </a:tcPr>
                 </a:tc>
                 <a:tc>
                   <a:txBody>
@@ -17427,7 +17655,14 @@
                       </a:r>
                     </a:p>
                   </a:txBody>
-                  <a:tcPr/>
+                  <a:tcPr>
+                    <a:solidFill>
+                      <a:schemeClr val="accent2">
+                        <a:lumMod val="20000"/>
+                        <a:lumOff val="80000"/>
+                      </a:schemeClr>
+                    </a:solidFill>
+                  </a:tcPr>
                 </a:tc>
                 <a:tc>
                   <a:txBody>
@@ -17440,7 +17675,14 @@
                       </a:r>
                     </a:p>
                   </a:txBody>
-                  <a:tcPr/>
+                  <a:tcPr>
+                    <a:solidFill>
+                      <a:schemeClr val="accent2">
+                        <a:lumMod val="20000"/>
+                        <a:lumOff val="80000"/>
+                      </a:schemeClr>
+                    </a:solidFill>
+                  </a:tcPr>
                 </a:tc>
                 <a:tc>
                   <a:txBody>
@@ -17453,7 +17695,14 @@
                       </a:r>
                     </a:p>
                   </a:txBody>
-                  <a:tcPr/>
+                  <a:tcPr>
+                    <a:solidFill>
+                      <a:schemeClr val="accent2">
+                        <a:lumMod val="20000"/>
+                        <a:lumOff val="80000"/>
+                      </a:schemeClr>
+                    </a:solidFill>
+                  </a:tcPr>
                 </a:tc>
                 <a:extLst>
                   <a:ext uri="{0D108BD9-81ED-4DB2-BD59-A6C34878D82A}">
@@ -17477,7 +17726,14 @@
                       </a:r>
                     </a:p>
                   </a:txBody>
-                  <a:tcPr/>
+                  <a:tcPr>
+                    <a:solidFill>
+                      <a:schemeClr val="accent2">
+                        <a:lumMod val="20000"/>
+                        <a:lumOff val="80000"/>
+                      </a:schemeClr>
+                    </a:solidFill>
+                  </a:tcPr>
                 </a:tc>
                 <a:tc>
                   <a:txBody>
@@ -17493,7 +17749,14 @@
                       </a:r>
                     </a:p>
                   </a:txBody>
-                  <a:tcPr/>
+                  <a:tcPr>
+                    <a:solidFill>
+                      <a:schemeClr val="accent2">
+                        <a:lumMod val="20000"/>
+                        <a:lumOff val="80000"/>
+                      </a:schemeClr>
+                    </a:solidFill>
+                  </a:tcPr>
                 </a:tc>
                 <a:tc>
                   <a:txBody>
@@ -17504,12 +17767,20 @@
                         <a:buNone/>
                       </a:pPr>
                       <a:r>
-                        <a:rPr lang="en-US" err="1"/>
+                        <a:rPr lang="en-US" dirty="0" err="1"/>
                         <a:t>pySerial</a:t>
                       </a:r>
-                    </a:p>
-                  </a:txBody>
-                  <a:tcPr/>
+                      <a:endParaRPr lang="en-US" dirty="0"/>
+                    </a:p>
+                  </a:txBody>
+                  <a:tcPr>
+                    <a:solidFill>
+                      <a:schemeClr val="accent2">
+                        <a:lumMod val="20000"/>
+                        <a:lumOff val="80000"/>
+                      </a:schemeClr>
+                    </a:solidFill>
+                  </a:tcPr>
                 </a:tc>
                 <a:tc>
                   <a:txBody>
@@ -17525,7 +17796,14 @@
                       </a:r>
                     </a:p>
                   </a:txBody>
-                  <a:tcPr/>
+                  <a:tcPr>
+                    <a:solidFill>
+                      <a:schemeClr val="accent2">
+                        <a:lumMod val="20000"/>
+                        <a:lumOff val="80000"/>
+                      </a:schemeClr>
+                    </a:solidFill>
+                  </a:tcPr>
                 </a:tc>
                 <a:tc>
                   <a:txBody>
@@ -17541,7 +17819,14 @@
                       </a:r>
                     </a:p>
                   </a:txBody>
-                  <a:tcPr/>
+                  <a:tcPr>
+                    <a:solidFill>
+                      <a:schemeClr val="accent2">
+                        <a:lumMod val="20000"/>
+                        <a:lumOff val="80000"/>
+                      </a:schemeClr>
+                    </a:solidFill>
+                  </a:tcPr>
                 </a:tc>
                 <a:tc>
                   <a:txBody>
@@ -17557,7 +17842,14 @@
                       </a:r>
                     </a:p>
                   </a:txBody>
-                  <a:tcPr/>
+                  <a:tcPr>
+                    <a:solidFill>
+                      <a:schemeClr val="accent2">
+                        <a:lumMod val="20000"/>
+                        <a:lumOff val="80000"/>
+                      </a:schemeClr>
+                    </a:solidFill>
+                  </a:tcPr>
                 </a:tc>
                 <a:tc>
                   <a:txBody>
@@ -17573,7 +17865,14 @@
                       </a:r>
                     </a:p>
                   </a:txBody>
-                  <a:tcPr/>
+                  <a:tcPr>
+                    <a:solidFill>
+                      <a:schemeClr val="accent2">
+                        <a:lumMod val="20000"/>
+                        <a:lumOff val="80000"/>
+                      </a:schemeClr>
+                    </a:solidFill>
+                  </a:tcPr>
                 </a:tc>
                 <a:extLst>
                   <a:ext uri="{0D108BD9-81ED-4DB2-BD59-A6C34878D82A}">
@@ -17610,7 +17909,7 @@
                       </a:r>
                       <a:r>
                         <a:rPr lang="en-US" dirty="0"/>
-                        <a:t> 2.2</a:t>
+                        <a:t> 2.2/ RS-485</a:t>
                       </a:r>
                     </a:p>
                   </a:txBody>
@@ -17622,7 +17921,11 @@
                     <a:lstStyle/>
                     <a:p>
                       <a:r>
-                        <a:rPr lang="en-US"/>
+                        <a:rPr lang="en-US" dirty="0" err="1"/>
+                        <a:t>pySerial</a:t>
+                      </a:r>
+                      <a:r>
+                        <a:rPr lang="en-US" dirty="0"/>
                         <a:t>?</a:t>
                       </a:r>
                     </a:p>
@@ -17716,7 +18019,14 @@
                       </a:r>
                     </a:p>
                   </a:txBody>
-                  <a:tcPr/>
+                  <a:tcPr>
+                    <a:solidFill>
+                      <a:schemeClr val="accent2">
+                        <a:lumMod val="20000"/>
+                        <a:lumOff val="80000"/>
+                      </a:schemeClr>
+                    </a:solidFill>
+                  </a:tcPr>
                 </a:tc>
                 <a:tc>
                   <a:txBody>
@@ -17732,7 +18042,14 @@
                       </a:r>
                     </a:p>
                   </a:txBody>
-                  <a:tcPr/>
+                  <a:tcPr>
+                    <a:solidFill>
+                      <a:schemeClr val="accent2">
+                        <a:lumMod val="20000"/>
+                        <a:lumOff val="80000"/>
+                      </a:schemeClr>
+                    </a:solidFill>
+                  </a:tcPr>
                 </a:tc>
                 <a:tc>
                   <a:txBody>
@@ -17743,12 +18060,20 @@
                         <a:buNone/>
                       </a:pPr>
                       <a:r>
-                        <a:rPr lang="en-US" err="1"/>
+                        <a:rPr lang="en-US" dirty="0" err="1"/>
                         <a:t>pySerial</a:t>
                       </a:r>
-                    </a:p>
-                  </a:txBody>
-                  <a:tcPr/>
+                      <a:endParaRPr lang="en-US" dirty="0"/>
+                    </a:p>
+                  </a:txBody>
+                  <a:tcPr>
+                    <a:solidFill>
+                      <a:schemeClr val="accent2">
+                        <a:lumMod val="20000"/>
+                        <a:lumOff val="80000"/>
+                      </a:schemeClr>
+                    </a:solidFill>
+                  </a:tcPr>
                 </a:tc>
                 <a:tc>
                   <a:txBody>
@@ -17764,7 +18089,14 @@
                       </a:r>
                     </a:p>
                   </a:txBody>
-                  <a:tcPr/>
+                  <a:tcPr>
+                    <a:solidFill>
+                      <a:schemeClr val="accent2">
+                        <a:lumMod val="20000"/>
+                        <a:lumOff val="80000"/>
+                      </a:schemeClr>
+                    </a:solidFill>
+                  </a:tcPr>
                 </a:tc>
                 <a:tc>
                   <a:txBody>
@@ -17780,7 +18112,14 @@
                       </a:r>
                     </a:p>
                   </a:txBody>
-                  <a:tcPr/>
+                  <a:tcPr>
+                    <a:solidFill>
+                      <a:schemeClr val="accent2">
+                        <a:lumMod val="20000"/>
+                        <a:lumOff val="80000"/>
+                      </a:schemeClr>
+                    </a:solidFill>
+                  </a:tcPr>
                 </a:tc>
                 <a:tc>
                   <a:txBody>
@@ -17796,7 +18135,14 @@
                       </a:r>
                     </a:p>
                   </a:txBody>
-                  <a:tcPr/>
+                  <a:tcPr>
+                    <a:solidFill>
+                      <a:schemeClr val="accent2">
+                        <a:lumMod val="20000"/>
+                        <a:lumOff val="80000"/>
+                      </a:schemeClr>
+                    </a:solidFill>
+                  </a:tcPr>
                 </a:tc>
                 <a:tc>
                   <a:txBody>
@@ -17812,7 +18158,14 @@
                       </a:r>
                     </a:p>
                   </a:txBody>
-                  <a:tcPr/>
+                  <a:tcPr>
+                    <a:solidFill>
+                      <a:schemeClr val="accent2">
+                        <a:lumMod val="20000"/>
+                        <a:lumOff val="80000"/>
+                      </a:schemeClr>
+                    </a:solidFill>
+                  </a:tcPr>
                 </a:tc>
                 <a:extLst>
                   <a:ext uri="{0D108BD9-81ED-4DB2-BD59-A6C34878D82A}">
@@ -18038,10 +18391,9 @@
                     <a:lstStyle/>
                     <a:p>
                       <a:r>
-                        <a:rPr lang="en-US"/>
+                        <a:rPr lang="en-US" dirty="0"/>
                         <a:t>yes</a:t>
                       </a:r>
-                      <a:endParaRPr lang="en-US" dirty="0"/>
                     </a:p>
                   </a:txBody>
                   <a:tcPr/>
@@ -18056,6 +18408,236 @@
           </a:graphicData>
         </a:graphic>
       </p:graphicFrame>
+      <p:sp>
+        <p:nvSpPr>
+          <p:cNvPr id="6" name="TextBox 5">
+            <a:extLst>
+              <a:ext uri="{FF2B5EF4-FFF2-40B4-BE49-F238E27FC236}">
+                <a16:creationId xmlns:a16="http://schemas.microsoft.com/office/drawing/2014/main" id="{94B7DC03-A5AA-4218-8D34-17A33194CECE}"/>
+              </a:ext>
+            </a:extLst>
+          </p:cNvPr>
+          <p:cNvSpPr txBox="1"/>
+          <p:nvPr/>
+        </p:nvSpPr>
+        <p:spPr>
+          <a:xfrm rot="16200000">
+            <a:off x="-1910921" y="3935788"/>
+            <a:ext cx="4620436" cy="400110"/>
+          </a:xfrm>
+          <a:prstGeom prst="rect">
+            <a:avLst/>
+          </a:prstGeom>
+          <a:noFill/>
+        </p:spPr>
+        <p:txBody>
+          <a:bodyPr wrap="square" rtlCol="0">
+            <a:spAutoFit/>
+          </a:bodyPr>
+          <a:lstStyle/>
+          <a:p>
+            <a:r>
+              <a:rPr lang="en-US" sz="2000" dirty="0">
+                <a:solidFill>
+                  <a:schemeClr val="accent2">
+                    <a:lumMod val="60000"/>
+                    <a:lumOff val="40000"/>
+                  </a:schemeClr>
+                </a:solidFill>
+              </a:rPr>
+              <a:t>Stepper Motors (Anaheim Motor Driver)</a:t>
+            </a:r>
+          </a:p>
+        </p:txBody>
+      </p:sp>
+      <p:cxnSp>
+        <p:nvCxnSpPr>
+          <p:cNvPr id="7" name="Straight Arrow Connector 6">
+            <a:extLst>
+              <a:ext uri="{FF2B5EF4-FFF2-40B4-BE49-F238E27FC236}">
+                <a16:creationId xmlns:a16="http://schemas.microsoft.com/office/drawing/2014/main" id="{3353B6DA-E185-475F-AFED-B0D117BC6795}"/>
+              </a:ext>
+            </a:extLst>
+          </p:cNvPr>
+          <p:cNvCxnSpPr>
+            <a:cxnSpLocks/>
+          </p:cNvCxnSpPr>
+          <p:nvPr/>
+        </p:nvCxnSpPr>
+        <p:spPr>
+          <a:xfrm>
+            <a:off x="575343" y="3669553"/>
+            <a:ext cx="185270" cy="0"/>
+          </a:xfrm>
+          <a:prstGeom prst="straightConnector1">
+            <a:avLst/>
+          </a:prstGeom>
+          <a:ln w="9525" cap="flat" cmpd="sng" algn="ctr">
+            <a:solidFill>
+              <a:schemeClr val="accent2"/>
+            </a:solidFill>
+            <a:prstDash val="solid"/>
+            <a:round/>
+            <a:headEnd type="none" w="med" len="med"/>
+            <a:tailEnd type="arrow" w="med" len="med"/>
+          </a:ln>
+        </p:spPr>
+        <p:style>
+          <a:lnRef idx="0">
+            <a:scrgbClr r="0" g="0" b="0"/>
+          </a:lnRef>
+          <a:fillRef idx="0">
+            <a:scrgbClr r="0" g="0" b="0"/>
+          </a:fillRef>
+          <a:effectRef idx="0">
+            <a:scrgbClr r="0" g="0" b="0"/>
+          </a:effectRef>
+          <a:fontRef idx="minor">
+            <a:schemeClr val="tx1"/>
+          </a:fontRef>
+        </p:style>
+      </p:cxnSp>
+      <p:cxnSp>
+        <p:nvCxnSpPr>
+          <p:cNvPr id="9" name="Straight Arrow Connector 8">
+            <a:extLst>
+              <a:ext uri="{FF2B5EF4-FFF2-40B4-BE49-F238E27FC236}">
+                <a16:creationId xmlns:a16="http://schemas.microsoft.com/office/drawing/2014/main" id="{A7011F1C-9DE4-42FD-BBF4-387D987FE795}"/>
+              </a:ext>
+            </a:extLst>
+          </p:cNvPr>
+          <p:cNvCxnSpPr>
+            <a:cxnSpLocks/>
+          </p:cNvCxnSpPr>
+          <p:nvPr/>
+        </p:nvCxnSpPr>
+        <p:spPr>
+          <a:xfrm>
+            <a:off x="575343" y="4083685"/>
+            <a:ext cx="185270" cy="0"/>
+          </a:xfrm>
+          <a:prstGeom prst="straightConnector1">
+            <a:avLst/>
+          </a:prstGeom>
+          <a:ln w="9525" cap="flat" cmpd="sng" algn="ctr">
+            <a:solidFill>
+              <a:schemeClr val="accent2"/>
+            </a:solidFill>
+            <a:prstDash val="solid"/>
+            <a:round/>
+            <a:headEnd type="none" w="med" len="med"/>
+            <a:tailEnd type="arrow" w="med" len="med"/>
+          </a:ln>
+        </p:spPr>
+        <p:style>
+          <a:lnRef idx="0">
+            <a:scrgbClr r="0" g="0" b="0"/>
+          </a:lnRef>
+          <a:fillRef idx="0">
+            <a:scrgbClr r="0" g="0" b="0"/>
+          </a:fillRef>
+          <a:effectRef idx="0">
+            <a:scrgbClr r="0" g="0" b="0"/>
+          </a:effectRef>
+          <a:fontRef idx="minor">
+            <a:schemeClr val="tx1"/>
+          </a:fontRef>
+        </p:style>
+      </p:cxnSp>
+      <p:cxnSp>
+        <p:nvCxnSpPr>
+          <p:cNvPr id="10" name="Straight Arrow Connector 9">
+            <a:extLst>
+              <a:ext uri="{FF2B5EF4-FFF2-40B4-BE49-F238E27FC236}">
+                <a16:creationId xmlns:a16="http://schemas.microsoft.com/office/drawing/2014/main" id="{74563482-9A23-4512-B8BF-B16F1ECEF313}"/>
+              </a:ext>
+            </a:extLst>
+          </p:cNvPr>
+          <p:cNvCxnSpPr>
+            <a:cxnSpLocks/>
+          </p:cNvCxnSpPr>
+          <p:nvPr/>
+        </p:nvCxnSpPr>
+        <p:spPr>
+          <a:xfrm>
+            <a:off x="575343" y="4401670"/>
+            <a:ext cx="185270" cy="0"/>
+          </a:xfrm>
+          <a:prstGeom prst="straightConnector1">
+            <a:avLst/>
+          </a:prstGeom>
+          <a:ln w="9525" cap="flat" cmpd="sng" algn="ctr">
+            <a:solidFill>
+              <a:schemeClr val="accent2"/>
+            </a:solidFill>
+            <a:prstDash val="solid"/>
+            <a:round/>
+            <a:headEnd type="none" w="med" len="med"/>
+            <a:tailEnd type="arrow" w="med" len="med"/>
+          </a:ln>
+        </p:spPr>
+        <p:style>
+          <a:lnRef idx="0">
+            <a:scrgbClr r="0" g="0" b="0"/>
+          </a:lnRef>
+          <a:fillRef idx="0">
+            <a:scrgbClr r="0" g="0" b="0"/>
+          </a:fillRef>
+          <a:effectRef idx="0">
+            <a:scrgbClr r="0" g="0" b="0"/>
+          </a:effectRef>
+          <a:fontRef idx="minor">
+            <a:schemeClr val="tx1"/>
+          </a:fontRef>
+        </p:style>
+      </p:cxnSp>
+      <p:cxnSp>
+        <p:nvCxnSpPr>
+          <p:cNvPr id="11" name="Straight Arrow Connector 10">
+            <a:extLst>
+              <a:ext uri="{FF2B5EF4-FFF2-40B4-BE49-F238E27FC236}">
+                <a16:creationId xmlns:a16="http://schemas.microsoft.com/office/drawing/2014/main" id="{1801C21A-E49F-4600-A66E-9747CFB577B6}"/>
+              </a:ext>
+            </a:extLst>
+          </p:cNvPr>
+          <p:cNvCxnSpPr>
+            <a:cxnSpLocks/>
+          </p:cNvCxnSpPr>
+          <p:nvPr/>
+        </p:nvCxnSpPr>
+        <p:spPr>
+          <a:xfrm>
+            <a:off x="575343" y="5405718"/>
+            <a:ext cx="185270" cy="0"/>
+          </a:xfrm>
+          <a:prstGeom prst="straightConnector1">
+            <a:avLst/>
+          </a:prstGeom>
+          <a:ln w="9525" cap="flat" cmpd="sng" algn="ctr">
+            <a:solidFill>
+              <a:schemeClr val="accent2"/>
+            </a:solidFill>
+            <a:prstDash val="solid"/>
+            <a:round/>
+            <a:headEnd type="none" w="med" len="med"/>
+            <a:tailEnd type="arrow" w="med" len="med"/>
+          </a:ln>
+        </p:spPr>
+        <p:style>
+          <a:lnRef idx="0">
+            <a:scrgbClr r="0" g="0" b="0"/>
+          </a:lnRef>
+          <a:fillRef idx="0">
+            <a:scrgbClr r="0" g="0" b="0"/>
+          </a:fillRef>
+          <a:effectRef idx="0">
+            <a:scrgbClr r="0" g="0" b="0"/>
+          </a:effectRef>
+          <a:fontRef idx="minor">
+            <a:schemeClr val="tx1"/>
+          </a:fontRef>
+        </p:style>
+      </p:cxnSp>
     </p:spTree>
     <p:extLst>
       <p:ext uri="{BB962C8B-B14F-4D97-AF65-F5344CB8AC3E}">
@@ -18153,7 +18735,7 @@
             </a:r>
             <a:r>
               <a:rPr lang="en-US" dirty="0"/>
-              <a:t>, Arduino, (other?), or some combination?  </a:t>
+              <a:t>, Arduino, (other?), or some combination? </a:t>
             </a:r>
           </a:p>
           <a:p>
@@ -18248,8 +18830,8 @@
         </p:nvSpPr>
         <p:spPr>
           <a:xfrm>
-            <a:off x="838200" y="4608981"/>
-            <a:ext cx="10515600" cy="2754326"/>
+            <a:off x="838199" y="4608981"/>
+            <a:ext cx="10748133" cy="2249019"/>
           </a:xfrm>
           <a:prstGeom prst="rect">
             <a:avLst/>
@@ -18448,6 +19030,18 @@
             <a:r>
               <a:rPr lang="en-US" dirty="0"/>
               <a:t>?</a:t>
+            </a:r>
+          </a:p>
+          <a:p>
+            <a:r>
+              <a:rPr lang="en-US" dirty="0"/>
+              <a:t>Stepper motors all driven by Anaheim Driver realistic?</a:t>
+            </a:r>
+          </a:p>
+          <a:p>
+            <a:r>
+              <a:rPr lang="en-US" dirty="0"/>
+              <a:t>Which FLIR camera are we using?</a:t>
             </a:r>
           </a:p>
           <a:p>
@@ -18764,6 +19358,21 @@
 </file>
 
 <file path=customXml/item1.xml><?xml version="1.0" encoding="utf-8"?>
+<p:properties xmlns:p="http://schemas.microsoft.com/office/2006/metadata/properties" xmlns:xsi="http://www.w3.org/2001/XMLSchema-instance" xmlns:pc="http://schemas.microsoft.com/office/infopath/2007/PartnerControls">
+  <documentManagement/>
+</p:properties>
+</file>
+
+<file path=customXml/item2.xml><?xml version="1.0" encoding="utf-8"?>
+<?mso-contentType ?>
+<FormTemplates xmlns="http://schemas.microsoft.com/sharepoint/v3/contenttype/forms">
+  <Display>DocumentLibraryForm</Display>
+  <Edit>DocumentLibraryForm</Edit>
+  <New>DocumentLibraryForm</New>
+</FormTemplates>
+</file>
+
+<file path=customXml/item3.xml><?xml version="1.0" encoding="utf-8"?>
 <ct:contentTypeSchema xmlns:ct="http://schemas.microsoft.com/office/2006/metadata/contentType" xmlns:ma="http://schemas.microsoft.com/office/2006/metadata/properties/metaAttributes" ct:_="" ma:_="" ma:contentTypeName="Document" ma:contentTypeID="0x0101009D924691EA2C7B40AB6A9AB0D74B6109" ma:contentTypeVersion="4" ma:contentTypeDescription="Create a new document." ma:contentTypeScope="" ma:versionID="969dcf63ad7ca121a142c13c03482375">
   <xsd:schema xmlns:xsd="http://www.w3.org/2001/XMLSchema" xmlns:xs="http://www.w3.org/2001/XMLSchema" xmlns:p="http://schemas.microsoft.com/office/2006/metadata/properties" xmlns:ns3="dc7dad40-3b92-4098-8b71-afb37a227404" targetNamespace="http://schemas.microsoft.com/office/2006/metadata/properties" ma:root="true" ma:fieldsID="c562071a3eb41a1a56646bac4d9f0253" ns3:_="">
     <xsd:import namespace="dc7dad40-3b92-4098-8b71-afb37a227404"/>
@@ -18909,22 +19518,31 @@
 </ct:contentTypeSchema>
 </file>
 
-<file path=customXml/item2.xml><?xml version="1.0" encoding="utf-8"?>
-<?mso-contentType ?>
-<FormTemplates xmlns="http://schemas.microsoft.com/sharepoint/v3/contenttype/forms">
-  <Display>DocumentLibraryForm</Display>
-  <Edit>DocumentLibraryForm</Edit>
-  <New>DocumentLibraryForm</New>
-</FormTemplates>
+<file path=customXml/itemProps1.xml><?xml version="1.0" encoding="utf-8"?>
+<ds:datastoreItem xmlns:ds="http://schemas.openxmlformats.org/officeDocument/2006/customXml" ds:itemID="{7CAFD2A6-D68F-4CD8-A561-A6B45A56E34B}">
+  <ds:schemaRefs>
+    <ds:schemaRef ds:uri="http://purl.org/dc/elements/1.1/"/>
+    <ds:schemaRef ds:uri="http://purl.org/dc/terms/"/>
+    <ds:schemaRef ds:uri="http://purl.org/dc/dcmitype/"/>
+    <ds:schemaRef ds:uri="dc7dad40-3b92-4098-8b71-afb37a227404"/>
+    <ds:schemaRef ds:uri="http://schemas.microsoft.com/office/2006/documentManagement/types"/>
+    <ds:schemaRef ds:uri="http://www.w3.org/XML/1998/namespace"/>
+    <ds:schemaRef ds:uri="http://schemas.microsoft.com/office/infopath/2007/PartnerControls"/>
+    <ds:schemaRef ds:uri="http://schemas.openxmlformats.org/package/2006/metadata/core-properties"/>
+    <ds:schemaRef ds:uri="http://schemas.microsoft.com/office/2006/metadata/properties"/>
+  </ds:schemaRefs>
+</ds:datastoreItem>
 </file>
 
-<file path=customXml/item3.xml><?xml version="1.0" encoding="utf-8"?>
-<p:properties xmlns:p="http://schemas.microsoft.com/office/2006/metadata/properties" xmlns:xsi="http://www.w3.org/2001/XMLSchema-instance" xmlns:pc="http://schemas.microsoft.com/office/infopath/2007/PartnerControls">
-  <documentManagement/>
-</p:properties>
+<file path=customXml/itemProps2.xml><?xml version="1.0" encoding="utf-8"?>
+<ds:datastoreItem xmlns:ds="http://schemas.openxmlformats.org/officeDocument/2006/customXml" ds:itemID="{51E7103F-1657-419D-A305-7DD96B9DA736}">
+  <ds:schemaRefs>
+    <ds:schemaRef ds:uri="http://schemas.microsoft.com/sharepoint/v3/contenttype/forms"/>
+  </ds:schemaRefs>
+</ds:datastoreItem>
 </file>
 
-<file path=customXml/itemProps1.xml><?xml version="1.0" encoding="utf-8"?>
+<file path=customXml/itemProps3.xml><?xml version="1.0" encoding="utf-8"?>
 <ds:datastoreItem xmlns:ds="http://schemas.openxmlformats.org/officeDocument/2006/customXml" ds:itemID="{8D15EA01-7D94-4E37-816C-579C4F6EFD23}">
   <ds:schemaRefs>
     <ds:schemaRef ds:uri="http://schemas.microsoft.com/office/2006/metadata/contentType"/>
@@ -18940,28 +19558,4 @@
     <ds:schemaRef ds:uri="http://schemas.microsoft.com/internal/obd"/>
   </ds:schemaRefs>
 </ds:datastoreItem>
-</file>
-
-<file path=customXml/itemProps2.xml><?xml version="1.0" encoding="utf-8"?>
-<ds:datastoreItem xmlns:ds="http://schemas.openxmlformats.org/officeDocument/2006/customXml" ds:itemID="{51E7103F-1657-419D-A305-7DD96B9DA736}">
-  <ds:schemaRefs>
-    <ds:schemaRef ds:uri="http://schemas.microsoft.com/sharepoint/v3/contenttype/forms"/>
-  </ds:schemaRefs>
-</ds:datastoreItem>
-</file>
-
-<file path=customXml/itemProps3.xml><?xml version="1.0" encoding="utf-8"?>
-<ds:datastoreItem xmlns:ds="http://schemas.openxmlformats.org/officeDocument/2006/customXml" ds:itemID="{7CAFD2A6-D68F-4CD8-A561-A6B45A56E34B}">
-  <ds:schemaRefs>
-    <ds:schemaRef ds:uri="http://purl.org/dc/elements/1.1/"/>
-    <ds:schemaRef ds:uri="http://purl.org/dc/terms/"/>
-    <ds:schemaRef ds:uri="http://purl.org/dc/dcmitype/"/>
-    <ds:schemaRef ds:uri="dc7dad40-3b92-4098-8b71-afb37a227404"/>
-    <ds:schemaRef ds:uri="http://schemas.microsoft.com/office/2006/documentManagement/types"/>
-    <ds:schemaRef ds:uri="http://www.w3.org/XML/1998/namespace"/>
-    <ds:schemaRef ds:uri="http://schemas.microsoft.com/office/infopath/2007/PartnerControls"/>
-    <ds:schemaRef ds:uri="http://schemas.openxmlformats.org/package/2006/metadata/core-properties"/>
-    <ds:schemaRef ds:uri="http://schemas.microsoft.com/office/2006/metadata/properties"/>
-  </ds:schemaRefs>
-</ds:datastoreItem>
 </file>
</xml_diff>

<commit_message>
Corrected some arrows, added some text
</commit_message>
<xml_diff>
--- a/SPHEREx-Calibration-Automation/presentations/SPHEREx_Calibration_Automation_Plan__Optics_Meeting_02162021.pptx
+++ b/SPHEREx-Calibration-Automation/presentations/SPHEREx_Calibration_Automation_Plan__Optics_Meeting_02162021.pptx
@@ -6591,7 +6591,7 @@
         </p:nvCxnSpPr>
         <p:spPr>
           <a:xfrm>
-            <a:off x="5650727" y="5234394"/>
+            <a:off x="5681405" y="5371959"/>
             <a:ext cx="527436" cy="0"/>
           </a:xfrm>
           <a:prstGeom prst="straightConnector1">
@@ -6747,6 +6747,91 @@
           </a:fontRef>
         </p:style>
       </p:cxnSp>
+      <p:cxnSp>
+        <p:nvCxnSpPr>
+          <p:cNvPr id="25" name="Connector: Elbow 24">
+            <a:extLst>
+              <a:ext uri="{FF2B5EF4-FFF2-40B4-BE49-F238E27FC236}">
+                <a16:creationId xmlns:a16="http://schemas.microsoft.com/office/drawing/2014/main" id="{D9FA6944-CF80-4E39-8097-01EB9776D4EA}"/>
+              </a:ext>
+            </a:extLst>
+          </p:cNvPr>
+          <p:cNvCxnSpPr>
+            <a:cxnSpLocks/>
+            <a:stCxn id="26" idx="5"/>
+            <a:endCxn id="30" idx="1"/>
+          </p:cNvCxnSpPr>
+          <p:nvPr/>
+        </p:nvCxnSpPr>
+        <p:spPr>
+          <a:xfrm>
+            <a:off x="5616006" y="3199798"/>
+            <a:ext cx="658235" cy="2034596"/>
+          </a:xfrm>
+          <a:prstGeom prst="bentConnector3">
+            <a:avLst>
+              <a:gd name="adj1" fmla="val 50000"/>
+            </a:avLst>
+          </a:prstGeom>
+          <a:ln>
+            <a:tailEnd type="triangle"/>
+          </a:ln>
+        </p:spPr>
+        <p:style>
+          <a:lnRef idx="2">
+            <a:schemeClr val="dk1"/>
+          </a:lnRef>
+          <a:fillRef idx="0">
+            <a:schemeClr val="dk1"/>
+          </a:fillRef>
+          <a:effectRef idx="1">
+            <a:schemeClr val="dk1"/>
+          </a:effectRef>
+          <a:fontRef idx="minor">
+            <a:schemeClr val="tx1"/>
+          </a:fontRef>
+        </p:style>
+      </p:cxnSp>
+      <p:sp>
+        <p:nvSpPr>
+          <p:cNvPr id="10" name="TextBox 9">
+            <a:extLst>
+              <a:ext uri="{FF2B5EF4-FFF2-40B4-BE49-F238E27FC236}">
+                <a16:creationId xmlns:a16="http://schemas.microsoft.com/office/drawing/2014/main" id="{DCE64B6D-C74E-4565-A1C7-86335E806FA8}"/>
+              </a:ext>
+            </a:extLst>
+          </p:cNvPr>
+          <p:cNvSpPr txBox="1"/>
+          <p:nvPr/>
+        </p:nvSpPr>
+        <p:spPr>
+          <a:xfrm>
+            <a:off x="2226363" y="5858926"/>
+            <a:ext cx="990079" cy="369332"/>
+          </a:xfrm>
+          <a:prstGeom prst="rect">
+            <a:avLst/>
+          </a:prstGeom>
+          <a:noFill/>
+        </p:spPr>
+        <p:txBody>
+          <a:bodyPr wrap="none" rtlCol="0">
+            <a:spAutoFit/>
+          </a:bodyPr>
+          <a:lstStyle/>
+          <a:p>
+            <a:r>
+              <a:rPr lang="en-US" dirty="0"/>
+              <a:t>Step in </a:t>
+            </a:r>
+            <a:r>
+              <a:rPr lang="el-GR" sz="1800" dirty="0"/>
+              <a:t>λ</a:t>
+            </a:r>
+            <a:endParaRPr lang="en-US" dirty="0"/>
+          </a:p>
+        </p:txBody>
+      </p:sp>
     </p:spTree>
     <p:extLst>
       <p:ext uri="{BB962C8B-B14F-4D97-AF65-F5344CB8AC3E}">
@@ -7401,19 +7486,17 @@
           </p:cNvPr>
           <p:cNvCxnSpPr>
             <a:cxnSpLocks/>
-            <a:endCxn id="38" idx="1"/>
           </p:cNvCxnSpPr>
           <p:nvPr/>
         </p:nvCxnSpPr>
         <p:spPr>
-          <a:xfrm rot="5400000" flipH="1">
-            <a:off x="87458" y="3571093"/>
-            <a:ext cx="2181028" cy="966084"/>
+          <a:xfrm rot="10800000">
+            <a:off x="676300" y="2963619"/>
+            <a:ext cx="283464" cy="1014195"/>
           </a:xfrm>
-          <a:prstGeom prst="bentConnector4">
+          <a:prstGeom prst="bentConnector3">
             <a:avLst>
-              <a:gd name="adj1" fmla="val -64072"/>
-              <a:gd name="adj2" fmla="val 123663"/>
+              <a:gd name="adj1" fmla="val 180645"/>
             </a:avLst>
           </a:prstGeom>
           <a:ln>
@@ -8444,7 +8527,7 @@
             <a:pPr algn="ctr"/>
             <a:r>
               <a:rPr lang="en-US" dirty="0"/>
-              <a:t>Measure </a:t>
+              <a:t>Image </a:t>
             </a:r>
             <a:r>
               <a:rPr lang="en-US" dirty="0" err="1"/>
@@ -8547,7 +8630,7 @@
         </p:nvCxnSpPr>
         <p:spPr>
           <a:xfrm>
-            <a:off x="8277795" y="1633715"/>
+            <a:off x="8180691" y="1633715"/>
             <a:ext cx="0" cy="5049078"/>
           </a:xfrm>
           <a:prstGeom prst="line">
@@ -8563,6 +8646,202 @@
           </a:fillRef>
           <a:effectRef idx="1">
             <a:schemeClr val="accent2"/>
+          </a:effectRef>
+          <a:fontRef idx="minor">
+            <a:schemeClr val="tx1"/>
+          </a:fontRef>
+        </p:style>
+      </p:cxnSp>
+      <p:cxnSp>
+        <p:nvCxnSpPr>
+          <p:cNvPr id="44" name="Connector: Elbow 43">
+            <a:extLst>
+              <a:ext uri="{FF2B5EF4-FFF2-40B4-BE49-F238E27FC236}">
+                <a16:creationId xmlns:a16="http://schemas.microsoft.com/office/drawing/2014/main" id="{1355C214-E099-46BF-ABD1-FCAC6CD5D36B}"/>
+              </a:ext>
+            </a:extLst>
+          </p:cNvPr>
+          <p:cNvCxnSpPr>
+            <a:cxnSpLocks/>
+            <a:stCxn id="77" idx="4"/>
+            <a:endCxn id="74" idx="1"/>
+          </p:cNvCxnSpPr>
+          <p:nvPr/>
+        </p:nvCxnSpPr>
+        <p:spPr>
+          <a:xfrm rot="5400000" flipH="1">
+            <a:off x="487062" y="5219016"/>
+            <a:ext cx="1379168" cy="972047"/>
+          </a:xfrm>
+          <a:prstGeom prst="bentConnector4">
+            <a:avLst>
+              <a:gd name="adj1" fmla="val -16575"/>
+              <a:gd name="adj2" fmla="val 123517"/>
+            </a:avLst>
+          </a:prstGeom>
+          <a:ln>
+            <a:tailEnd type="triangle"/>
+          </a:ln>
+        </p:spPr>
+        <p:style>
+          <a:lnRef idx="2">
+            <a:schemeClr val="dk1"/>
+          </a:lnRef>
+          <a:fillRef idx="0">
+            <a:schemeClr val="dk1"/>
+          </a:fillRef>
+          <a:effectRef idx="1">
+            <a:schemeClr val="dk1"/>
+          </a:effectRef>
+          <a:fontRef idx="minor">
+            <a:schemeClr val="tx1"/>
+          </a:fontRef>
+        </p:style>
+      </p:cxnSp>
+      <p:sp>
+        <p:nvSpPr>
+          <p:cNvPr id="47" name="TextBox 46">
+            <a:extLst>
+              <a:ext uri="{FF2B5EF4-FFF2-40B4-BE49-F238E27FC236}">
+                <a16:creationId xmlns:a16="http://schemas.microsoft.com/office/drawing/2014/main" id="{BE39ACA3-EA7A-4FF0-98CE-78BEE54A1809}"/>
+              </a:ext>
+            </a:extLst>
+          </p:cNvPr>
+          <p:cNvSpPr txBox="1"/>
+          <p:nvPr/>
+        </p:nvSpPr>
+        <p:spPr>
+          <a:xfrm>
+            <a:off x="381223" y="3156916"/>
+            <a:ext cx="1157082" cy="523220"/>
+          </a:xfrm>
+          <a:prstGeom prst="rect">
+            <a:avLst/>
+          </a:prstGeom>
+          <a:noFill/>
+        </p:spPr>
+        <p:txBody>
+          <a:bodyPr wrap="square" rtlCol="0">
+            <a:spAutoFit/>
+          </a:bodyPr>
+          <a:lstStyle/>
+          <a:p>
+            <a:r>
+              <a:rPr lang="en-US" sz="1400" dirty="0"/>
+              <a:t>Minimize Spot Size</a:t>
+            </a:r>
+          </a:p>
+        </p:txBody>
+      </p:sp>
+      <p:sp>
+        <p:nvSpPr>
+          <p:cNvPr id="48" name="TextBox 47">
+            <a:extLst>
+              <a:ext uri="{FF2B5EF4-FFF2-40B4-BE49-F238E27FC236}">
+                <a16:creationId xmlns:a16="http://schemas.microsoft.com/office/drawing/2014/main" id="{A283AA8D-B573-4D06-B878-2324D9E81C75}"/>
+              </a:ext>
+            </a:extLst>
+          </p:cNvPr>
+          <p:cNvSpPr txBox="1"/>
+          <p:nvPr/>
+        </p:nvSpPr>
+        <p:spPr>
+          <a:xfrm>
+            <a:off x="401144" y="5188242"/>
+            <a:ext cx="1157082" cy="523220"/>
+          </a:xfrm>
+          <a:prstGeom prst="rect">
+            <a:avLst/>
+          </a:prstGeom>
+          <a:noFill/>
+        </p:spPr>
+        <p:txBody>
+          <a:bodyPr wrap="square" rtlCol="0">
+            <a:spAutoFit/>
+          </a:bodyPr>
+          <a:lstStyle/>
+          <a:p>
+            <a:r>
+              <a:rPr lang="en-US" sz="1400" dirty="0"/>
+              <a:t>Minimize Spot Size</a:t>
+            </a:r>
+          </a:p>
+        </p:txBody>
+      </p:sp>
+      <p:sp>
+        <p:nvSpPr>
+          <p:cNvPr id="49" name="TextBox 48">
+            <a:extLst>
+              <a:ext uri="{FF2B5EF4-FFF2-40B4-BE49-F238E27FC236}">
+                <a16:creationId xmlns:a16="http://schemas.microsoft.com/office/drawing/2014/main" id="{676C772D-B757-4BF4-8278-BE9DE9353CB8}"/>
+              </a:ext>
+            </a:extLst>
+          </p:cNvPr>
+          <p:cNvSpPr txBox="1"/>
+          <p:nvPr/>
+        </p:nvSpPr>
+        <p:spPr>
+          <a:xfrm>
+            <a:off x="3448816" y="3144034"/>
+            <a:ext cx="1157082" cy="523220"/>
+          </a:xfrm>
+          <a:prstGeom prst="rect">
+            <a:avLst/>
+          </a:prstGeom>
+          <a:noFill/>
+        </p:spPr>
+        <p:txBody>
+          <a:bodyPr wrap="square" rtlCol="0">
+            <a:spAutoFit/>
+          </a:bodyPr>
+          <a:lstStyle/>
+          <a:p>
+            <a:r>
+              <a:rPr lang="en-US" sz="1400" dirty="0"/>
+              <a:t>Minimize Spot Size</a:t>
+            </a:r>
+          </a:p>
+        </p:txBody>
+      </p:sp>
+      <p:cxnSp>
+        <p:nvCxnSpPr>
+          <p:cNvPr id="50" name="Connector: Elbow 49">
+            <a:extLst>
+              <a:ext uri="{FF2B5EF4-FFF2-40B4-BE49-F238E27FC236}">
+                <a16:creationId xmlns:a16="http://schemas.microsoft.com/office/drawing/2014/main" id="{9DD6CA7C-A16C-4140-A197-D9A692A39AD6}"/>
+              </a:ext>
+            </a:extLst>
+          </p:cNvPr>
+          <p:cNvCxnSpPr>
+            <a:cxnSpLocks/>
+            <a:stCxn id="51" idx="1"/>
+            <a:endCxn id="100" idx="1"/>
+          </p:cNvCxnSpPr>
+          <p:nvPr/>
+        </p:nvCxnSpPr>
+        <p:spPr>
+          <a:xfrm rot="10800000">
+            <a:off x="8513908" y="2910891"/>
+            <a:ext cx="127811" cy="2190982"/>
+          </a:xfrm>
+          <a:prstGeom prst="bentConnector3">
+            <a:avLst>
+              <a:gd name="adj1" fmla="val 278858"/>
+            </a:avLst>
+          </a:prstGeom>
+          <a:ln>
+            <a:tailEnd type="triangle"/>
+          </a:ln>
+        </p:spPr>
+        <p:style>
+          <a:lnRef idx="2">
+            <a:schemeClr val="dk1"/>
+          </a:lnRef>
+          <a:fillRef idx="0">
+            <a:schemeClr val="dk1"/>
+          </a:fillRef>
+          <a:effectRef idx="1">
+            <a:schemeClr val="dk1"/>
           </a:effectRef>
           <a:fontRef idx="minor">
             <a:schemeClr val="tx1"/>

</xml_diff>

<commit_message>
Edits done during presentation
</commit_message>
<xml_diff>
--- a/SPHEREx-Calibration-Automation/presentations/SPHEREx_Calibration_Automation_Plan__Optics_Meeting_02162021.pptx
+++ b/SPHEREx-Calibration-Automation/presentations/SPHEREx_Calibration_Automation_Plan__Optics_Meeting_02162021.pptx
@@ -4190,7 +4190,7 @@
           <a:p>
             <a:r>
               <a:rPr lang="en-US" dirty="0"/>
-              <a:t>Which FLIR camera are we using?</a:t>
+              <a:t>Which FLIR camera are we using?  USB camera better?</a:t>
             </a:r>
           </a:p>
           <a:p>
@@ -5502,9 +5502,9 @@
           <p:nvPr/>
         </p:nvCxnSpPr>
         <p:spPr>
-          <a:xfrm flipV="1">
-            <a:off x="7475218" y="2923792"/>
-            <a:ext cx="1093745" cy="739099"/>
+          <a:xfrm>
+            <a:off x="7424056" y="2516623"/>
+            <a:ext cx="1144907" cy="407170"/>
           </a:xfrm>
           <a:prstGeom prst="straightConnector1">
             <a:avLst/>
@@ -8949,7 +8949,7 @@
           <p:nvPr>
             <p:extLst>
               <p:ext uri="{D42A27DB-BD31-4B8C-83A1-F6EECF244321}">
-                <p14:modId xmlns:p14="http://schemas.microsoft.com/office/powerpoint/2010/main" val="554787497"/>
+                <p14:modId xmlns:p14="http://schemas.microsoft.com/office/powerpoint/2010/main" val="2097262687"/>
               </p:ext>
             </p:extLst>
           </p:nvPr>
@@ -9499,8 +9499,8 @@
                     <a:lstStyle/>
                     <a:p>
                       <a:r>
-                        <a:rPr lang="en-US"/>
-                        <a:t>passive</a:t>
+                        <a:rPr lang="en-US" dirty="0"/>
+                        <a:t>active</a:t>
                       </a:r>
                     </a:p>
                   </a:txBody>
@@ -9658,7 +9658,7 @@
                     <a:p>
                       <a:r>
                         <a:rPr lang="en-US" dirty="0"/>
-                        <a:t>Cold Shutter</a:t>
+                        <a:t>Shutter</a:t>
                       </a:r>
                     </a:p>
                   </a:txBody>
@@ -10005,14 +10005,14 @@
           <p:nvPr>
             <p:extLst>
               <p:ext uri="{D42A27DB-BD31-4B8C-83A1-F6EECF244321}">
-                <p14:modId xmlns:p14="http://schemas.microsoft.com/office/powerpoint/2010/main" val="3426267763"/>
+                <p14:modId xmlns:p14="http://schemas.microsoft.com/office/powerpoint/2010/main" val="2277358003"/>
               </p:ext>
             </p:extLst>
           </p:nvPr>
         </p:nvGraphicFramePr>
         <p:xfrm>
           <a:off x="838200" y="1825625"/>
-          <a:ext cx="10515603" cy="4516120"/>
+          <a:ext cx="10515603" cy="4886960"/>
         </p:xfrm>
         <a:graphic>
           <a:graphicData uri="http://schemas.openxmlformats.org/drawingml/2006/table">
@@ -10528,6 +10528,135 @@
                 <a:extLst>
                   <a:ext uri="{0D108BD9-81ED-4DB2-BD59-A6C34878D82A}">
                     <a16:rowId xmlns:a16="http://schemas.microsoft.com/office/drawing/2014/main" val="2457868670"/>
+                  </a:ext>
+                </a:extLst>
+              </a:tr>
+              <a:tr h="370840">
+                <a:tc>
+                  <a:txBody>
+                    <a:bodyPr/>
+                    <a:lstStyle/>
+                    <a:p>
+                      <a:r>
+                        <a:rPr lang="en-US" dirty="0"/>
+                        <a:t>Moonlight Motors</a:t>
+                      </a:r>
+                    </a:p>
+                  </a:txBody>
+                  <a:tcPr>
+                    <a:solidFill>
+                      <a:schemeClr val="accent2">
+                        <a:lumMod val="20000"/>
+                        <a:lumOff val="80000"/>
+                      </a:schemeClr>
+                    </a:solidFill>
+                  </a:tcPr>
+                </a:tc>
+                <a:tc>
+                  <a:txBody>
+                    <a:bodyPr/>
+                    <a:lstStyle/>
+                    <a:p>
+                      <a:endParaRPr lang="en-US" dirty="0"/>
+                    </a:p>
+                  </a:txBody>
+                  <a:tcPr>
+                    <a:solidFill>
+                      <a:schemeClr val="accent2">
+                        <a:lumMod val="20000"/>
+                        <a:lumOff val="80000"/>
+                      </a:schemeClr>
+                    </a:solidFill>
+                  </a:tcPr>
+                </a:tc>
+                <a:tc>
+                  <a:txBody>
+                    <a:bodyPr/>
+                    <a:lstStyle/>
+                    <a:p>
+                      <a:endParaRPr lang="en-US" dirty="0"/>
+                    </a:p>
+                  </a:txBody>
+                  <a:tcPr>
+                    <a:solidFill>
+                      <a:schemeClr val="accent2">
+                        <a:lumMod val="20000"/>
+                        <a:lumOff val="80000"/>
+                      </a:schemeClr>
+                    </a:solidFill>
+                  </a:tcPr>
+                </a:tc>
+                <a:tc>
+                  <a:txBody>
+                    <a:bodyPr/>
+                    <a:lstStyle/>
+                    <a:p>
+                      <a:endParaRPr lang="en-US" dirty="0"/>
+                    </a:p>
+                  </a:txBody>
+                  <a:tcPr>
+                    <a:solidFill>
+                      <a:schemeClr val="accent2">
+                        <a:lumMod val="20000"/>
+                        <a:lumOff val="80000"/>
+                      </a:schemeClr>
+                    </a:solidFill>
+                  </a:tcPr>
+                </a:tc>
+                <a:tc>
+                  <a:txBody>
+                    <a:bodyPr/>
+                    <a:lstStyle/>
+                    <a:p>
+                      <a:endParaRPr lang="en-US" dirty="0"/>
+                    </a:p>
+                  </a:txBody>
+                  <a:tcPr>
+                    <a:solidFill>
+                      <a:schemeClr val="accent2">
+                        <a:lumMod val="20000"/>
+                        <a:lumOff val="80000"/>
+                      </a:schemeClr>
+                    </a:solidFill>
+                  </a:tcPr>
+                </a:tc>
+                <a:tc>
+                  <a:txBody>
+                    <a:bodyPr/>
+                    <a:lstStyle/>
+                    <a:p>
+                      <a:endParaRPr lang="en-US" dirty="0"/>
+                    </a:p>
+                  </a:txBody>
+                  <a:tcPr>
+                    <a:solidFill>
+                      <a:schemeClr val="accent2">
+                        <a:lumMod val="20000"/>
+                        <a:lumOff val="80000"/>
+                      </a:schemeClr>
+                    </a:solidFill>
+                  </a:tcPr>
+                </a:tc>
+                <a:tc>
+                  <a:txBody>
+                    <a:bodyPr/>
+                    <a:lstStyle/>
+                    <a:p>
+                      <a:endParaRPr lang="en-US" dirty="0"/>
+                    </a:p>
+                  </a:txBody>
+                  <a:tcPr>
+                    <a:solidFill>
+                      <a:schemeClr val="accent2">
+                        <a:lumMod val="20000"/>
+                        <a:lumOff val="80000"/>
+                      </a:schemeClr>
+                    </a:solidFill>
+                  </a:tcPr>
+                </a:tc>
+                <a:extLst>
+                  <a:ext uri="{0D108BD9-81ED-4DB2-BD59-A6C34878D82A}">
+                    <a16:rowId xmlns:a16="http://schemas.microsoft.com/office/drawing/2014/main" val="3597910259"/>
                   </a:ext>
                 </a:extLst>
               </a:tr>
@@ -11729,7 +11858,7 @@
             <p:ph idx="1"/>
             <p:extLst>
               <p:ext uri="{D42A27DB-BD31-4B8C-83A1-F6EECF244321}">
-                <p14:modId xmlns:p14="http://schemas.microsoft.com/office/powerpoint/2010/main" val="2949597699"/>
+                <p14:modId xmlns:p14="http://schemas.microsoft.com/office/powerpoint/2010/main" val="1554976769"/>
               </p:ext>
             </p:extLst>
           </p:nvPr>
@@ -12602,7 +12731,14 @@
                     <a:bodyPr/>
                     <a:lstStyle/>
                     <a:p>
-                      <a:endParaRPr lang="en-US" dirty="0"/>
+                      <a:endParaRPr lang="en-US" dirty="0">
+                        <a:solidFill>
+                          <a:schemeClr val="accent2">
+                            <a:lumMod val="60000"/>
+                            <a:lumOff val="40000"/>
+                          </a:schemeClr>
+                        </a:solidFill>
+                      </a:endParaRPr>
                     </a:p>
                   </a:txBody>
                   <a:tcPr>

</xml_diff>